<commit_message>
add violin sounds to basic scale file
</commit_message>
<xml_diff>
--- a/Pages:Routes.pptx
+++ b/Pages:Routes.pptx
@@ -12,6 +12,8 @@
     <p:sldId id="257" r:id="rId6"/>
     <p:sldId id="265" r:id="rId7"/>
     <p:sldId id="261" r:id="rId8"/>
+    <p:sldId id="266" r:id="rId9"/>
+    <p:sldId id="267" r:id="rId10"/>
   </p:sldIdLst>
   <p:sldSz cx="12192000" cy="6858000"/>
   <p:notesSz cx="6858000" cy="9144000"/>
@@ -110,6 +112,11 @@
       </a:defRPr>
     </a:lvl9pPr>
   </p:defaultTextStyle>
+  <p:extLst>
+    <p:ext uri="{EFAFB233-063F-42B5-8137-9DF3F51BA10A}">
+      <p15:sldGuideLst xmlns:p15="http://schemas.microsoft.com/office/powerpoint/2012/main"/>
+    </p:ext>
+  </p:extLst>
 </p:presentation>
 </file>
 
@@ -244,7 +251,7 @@
           <a:p>
             <a:fld id="{D4B1D998-022D-AE4F-8FF7-6C8D0D1D7320}" type="datetimeFigureOut">
               <a:rPr lang="en-US" smtClean="0"/>
-              <a:t>6/21/16</a:t>
+              <a:t>6/23/16</a:t>
             </a:fld>
             <a:endParaRPr lang="en-US"/>
           </a:p>
@@ -414,7 +421,7 @@
           <a:p>
             <a:fld id="{D4B1D998-022D-AE4F-8FF7-6C8D0D1D7320}" type="datetimeFigureOut">
               <a:rPr lang="en-US" smtClean="0"/>
-              <a:t>6/21/16</a:t>
+              <a:t>6/23/16</a:t>
             </a:fld>
             <a:endParaRPr lang="en-US"/>
           </a:p>
@@ -594,7 +601,7 @@
           <a:p>
             <a:fld id="{D4B1D998-022D-AE4F-8FF7-6C8D0D1D7320}" type="datetimeFigureOut">
               <a:rPr lang="en-US" smtClean="0"/>
-              <a:t>6/21/16</a:t>
+              <a:t>6/23/16</a:t>
             </a:fld>
             <a:endParaRPr lang="en-US"/>
           </a:p>
@@ -764,7 +771,7 @@
           <a:p>
             <a:fld id="{D4B1D998-022D-AE4F-8FF7-6C8D0D1D7320}" type="datetimeFigureOut">
               <a:rPr lang="en-US" smtClean="0"/>
-              <a:t>6/21/16</a:t>
+              <a:t>6/23/16</a:t>
             </a:fld>
             <a:endParaRPr lang="en-US"/>
           </a:p>
@@ -1010,7 +1017,7 @@
           <a:p>
             <a:fld id="{D4B1D998-022D-AE4F-8FF7-6C8D0D1D7320}" type="datetimeFigureOut">
               <a:rPr lang="en-US" smtClean="0"/>
-              <a:t>6/21/16</a:t>
+              <a:t>6/23/16</a:t>
             </a:fld>
             <a:endParaRPr lang="en-US"/>
           </a:p>
@@ -1242,7 +1249,7 @@
           <a:p>
             <a:fld id="{D4B1D998-022D-AE4F-8FF7-6C8D0D1D7320}" type="datetimeFigureOut">
               <a:rPr lang="en-US" smtClean="0"/>
-              <a:t>6/21/16</a:t>
+              <a:t>6/23/16</a:t>
             </a:fld>
             <a:endParaRPr lang="en-US"/>
           </a:p>
@@ -1609,7 +1616,7 @@
           <a:p>
             <a:fld id="{D4B1D998-022D-AE4F-8FF7-6C8D0D1D7320}" type="datetimeFigureOut">
               <a:rPr lang="en-US" smtClean="0"/>
-              <a:t>6/21/16</a:t>
+              <a:t>6/23/16</a:t>
             </a:fld>
             <a:endParaRPr lang="en-US"/>
           </a:p>
@@ -1727,7 +1734,7 @@
           <a:p>
             <a:fld id="{D4B1D998-022D-AE4F-8FF7-6C8D0D1D7320}" type="datetimeFigureOut">
               <a:rPr lang="en-US" smtClean="0"/>
-              <a:t>6/21/16</a:t>
+              <a:t>6/23/16</a:t>
             </a:fld>
             <a:endParaRPr lang="en-US"/>
           </a:p>
@@ -1822,7 +1829,7 @@
           <a:p>
             <a:fld id="{D4B1D998-022D-AE4F-8FF7-6C8D0D1D7320}" type="datetimeFigureOut">
               <a:rPr lang="en-US" smtClean="0"/>
-              <a:t>6/21/16</a:t>
+              <a:t>6/23/16</a:t>
             </a:fld>
             <a:endParaRPr lang="en-US"/>
           </a:p>
@@ -2099,7 +2106,7 @@
           <a:p>
             <a:fld id="{D4B1D998-022D-AE4F-8FF7-6C8D0D1D7320}" type="datetimeFigureOut">
               <a:rPr lang="en-US" smtClean="0"/>
-              <a:t>6/21/16</a:t>
+              <a:t>6/23/16</a:t>
             </a:fld>
             <a:endParaRPr lang="en-US"/>
           </a:p>
@@ -2352,7 +2359,7 @@
           <a:p>
             <a:fld id="{D4B1D998-022D-AE4F-8FF7-6C8D0D1D7320}" type="datetimeFigureOut">
               <a:rPr lang="en-US" smtClean="0"/>
-              <a:t>6/21/16</a:t>
+              <a:t>6/23/16</a:t>
             </a:fld>
             <a:endParaRPr lang="en-US"/>
           </a:p>
@@ -2565,7 +2572,7 @@
           <a:p>
             <a:fld id="{D4B1D998-022D-AE4F-8FF7-6C8D0D1D7320}" type="datetimeFigureOut">
               <a:rPr lang="en-US" smtClean="0"/>
-              <a:t>6/21/16</a:t>
+              <a:t>6/23/16</a:t>
             </a:fld>
             <a:endParaRPr lang="en-US"/>
           </a:p>
@@ -2978,7 +2985,7 @@
         </p:nvSpPr>
         <p:spPr>
           <a:xfrm>
-            <a:off x="1749287" y="2800269"/>
+            <a:off x="1469067" y="2692114"/>
             <a:ext cx="8368748" cy="1570383"/>
           </a:xfrm>
           <a:prstGeom prst="rect">
@@ -3552,8 +3559,8 @@
         </p:nvSpPr>
         <p:spPr>
           <a:xfrm>
-            <a:off x="2227007" y="2979173"/>
-            <a:ext cx="6072488" cy="499521"/>
+            <a:off x="4616246" y="4324575"/>
+            <a:ext cx="4955457" cy="601386"/>
           </a:xfrm>
           <a:prstGeom prst="rect">
             <a:avLst/>
@@ -3602,6 +3609,12 @@
           <a:prstGeom prst="rect">
             <a:avLst/>
           </a:prstGeom>
+          <a:solidFill>
+            <a:schemeClr val="accent6">
+              <a:lumMod val="60000"/>
+              <a:lumOff val="40000"/>
+            </a:schemeClr>
+          </a:solidFill>
         </p:spPr>
         <p:style>
           <a:lnRef idx="2">
@@ -3640,7 +3653,7 @@
         </p:nvSpPr>
         <p:spPr>
           <a:xfrm>
-            <a:off x="7930143" y="4041377"/>
+            <a:off x="8549576" y="2709535"/>
             <a:ext cx="2875935" cy="914400"/>
           </a:xfrm>
           <a:prstGeom prst="rect">
@@ -4029,6 +4042,50 @@
           </a:p>
         </p:txBody>
       </p:sp>
+      <p:sp>
+        <p:nvSpPr>
+          <p:cNvPr id="7" name="Rectangle 6"/>
+          <p:cNvSpPr/>
+          <p:nvPr/>
+        </p:nvSpPr>
+        <p:spPr>
+          <a:xfrm>
+            <a:off x="4586750" y="3897191"/>
+            <a:ext cx="4955457" cy="601386"/>
+          </a:xfrm>
+          <a:prstGeom prst="rect">
+            <a:avLst/>
+          </a:prstGeom>
+        </p:spPr>
+        <p:style>
+          <a:lnRef idx="2">
+            <a:schemeClr val="accent1">
+              <a:shade val="50000"/>
+            </a:schemeClr>
+          </a:lnRef>
+          <a:fillRef idx="1">
+            <a:schemeClr val="accent1"/>
+          </a:fillRef>
+          <a:effectRef idx="0">
+            <a:schemeClr val="accent1"/>
+          </a:effectRef>
+          <a:fontRef idx="minor">
+            <a:schemeClr val="lt1"/>
+          </a:fontRef>
+        </p:style>
+        <p:txBody>
+          <a:bodyPr rtlCol="0" anchor="ctr"/>
+          <a:lstStyle/>
+          <a:p>
+            <a:pPr algn="ctr"/>
+            <a:r>
+              <a:rPr lang="en-US" dirty="0" smtClean="0"/>
+              <a:t>Open  </a:t>
+            </a:r>
+            <a:endParaRPr lang="en-US" dirty="0"/>
+          </a:p>
+        </p:txBody>
+      </p:sp>
     </p:spTree>
     <p:extLst>
       <p:ext uri="{BB962C8B-B14F-4D97-AF65-F5344CB8AC3E}">
@@ -4408,8 +4465,8 @@
         </p:nvSpPr>
         <p:spPr>
           <a:xfrm>
-            <a:off x="2126974" y="3522940"/>
-            <a:ext cx="8368748" cy="1570383"/>
+            <a:off x="1997986" y="2487433"/>
+            <a:ext cx="5743934" cy="1474968"/>
           </a:xfrm>
           <a:prstGeom prst="rect">
             <a:avLst/>
@@ -4526,7 +4583,15 @@
             <a:pPr algn="ctr"/>
             <a:r>
               <a:rPr lang="en-US" u="sng" dirty="0" smtClean="0"/>
-              <a:t>Record a new song</a:t>
+              <a:t>Start stop  listen </a:t>
+            </a:r>
+            <a:r>
+              <a:rPr lang="en-US" u="sng" dirty="0" err="1" smtClean="0"/>
+              <a:t>etc</a:t>
+            </a:r>
+            <a:r>
+              <a:rPr lang="en-US" u="sng" dirty="0" smtClean="0"/>
+              <a:t>  </a:t>
             </a:r>
             <a:endParaRPr lang="en-US" u="sng" dirty="0"/>
           </a:p>
@@ -4534,90 +4599,35 @@
       </p:sp>
       <p:sp>
         <p:nvSpPr>
-          <p:cNvPr id="2" name="Rectangle 1"/>
-          <p:cNvSpPr/>
+          <p:cNvPr id="3" name="TextBox 2"/>
+          <p:cNvSpPr txBox="1"/>
           <p:nvPr/>
         </p:nvSpPr>
         <p:spPr>
           <a:xfrm>
-            <a:off x="4955458" y="1490868"/>
-            <a:ext cx="2949677" cy="1252332"/>
+            <a:off x="2126974" y="4551680"/>
+            <a:ext cx="3375604" cy="646331"/>
           </a:xfrm>
           <a:prstGeom prst="rect">
             <a:avLst/>
           </a:prstGeom>
+          <a:noFill/>
         </p:spPr>
-        <p:style>
-          <a:lnRef idx="2">
-            <a:schemeClr val="accent1">
-              <a:shade val="50000"/>
-            </a:schemeClr>
-          </a:lnRef>
-          <a:fillRef idx="1">
-            <a:schemeClr val="accent1"/>
-          </a:fillRef>
-          <a:effectRef idx="0">
-            <a:schemeClr val="accent1"/>
-          </a:effectRef>
-          <a:fontRef idx="minor">
-            <a:schemeClr val="lt1"/>
-          </a:fontRef>
-        </p:style>
-        <p:txBody>
-          <a:bodyPr rtlCol="0" anchor="ctr"/>
-          <a:lstStyle/>
-          <a:p>
-            <a:pPr algn="ctr"/>
+        <p:txBody>
+          <a:bodyPr wrap="none" rtlCol="0">
+            <a:spAutoFit/>
+          </a:bodyPr>
+          <a:lstStyle/>
+          <a:p>
             <a:r>
               <a:rPr lang="en-US" dirty="0" smtClean="0"/>
-              <a:t>NEW SONG FORM</a:t>
-            </a:r>
-            <a:endParaRPr lang="en-US" dirty="0"/>
-          </a:p>
-        </p:txBody>
-      </p:sp>
-      <p:sp>
-        <p:nvSpPr>
-          <p:cNvPr id="9" name="Rectangle 8"/>
-          <p:cNvSpPr/>
-          <p:nvPr/>
-        </p:nvSpPr>
-        <p:spPr>
-          <a:xfrm>
-            <a:off x="386342" y="2564295"/>
-            <a:ext cx="2875935" cy="914400"/>
-          </a:xfrm>
-          <a:prstGeom prst="rect">
-            <a:avLst/>
-          </a:prstGeom>
-          <a:solidFill>
-            <a:srgbClr val="D650D5"/>
-          </a:solidFill>
-        </p:spPr>
-        <p:style>
-          <a:lnRef idx="2">
-            <a:schemeClr val="accent1">
-              <a:shade val="50000"/>
-            </a:schemeClr>
-          </a:lnRef>
-          <a:fillRef idx="1">
-            <a:schemeClr val="accent1"/>
-          </a:fillRef>
-          <a:effectRef idx="0">
-            <a:schemeClr val="accent1"/>
-          </a:effectRef>
-          <a:fontRef idx="minor">
-            <a:schemeClr val="lt1"/>
-          </a:fontRef>
-        </p:style>
-        <p:txBody>
-          <a:bodyPr rtlCol="0" anchor="ctr"/>
-          <a:lstStyle/>
-          <a:p>
-            <a:pPr algn="ctr"/>
+              <a:t>You’ve created a new song</a:t>
+            </a:r>
+          </a:p>
+          <a:p>
             <a:r>
               <a:rPr lang="en-US" dirty="0" smtClean="0"/>
-              <a:t>CREATE SONG ROUTE</a:t>
+              <a:t>It’s part of this project called blah </a:t>
             </a:r>
             <a:endParaRPr lang="en-US" dirty="0"/>
           </a:p>
@@ -4653,10 +4663,1620 @@
           <a:chExt cx="0" cy="0"/>
         </a:xfrm>
       </p:grpSpPr>
+      <p:graphicFrame>
+        <p:nvGraphicFramePr>
+          <p:cNvPr id="2" name="Table 1"/>
+          <p:cNvGraphicFramePr>
+            <a:graphicFrameLocks noGrp="1"/>
+          </p:cNvGraphicFramePr>
+          <p:nvPr>
+            <p:extLst>
+              <p:ext uri="{D42A27DB-BD31-4B8C-83A1-F6EECF244321}">
+                <p14:modId xmlns:p14="http://schemas.microsoft.com/office/powerpoint/2010/main" val="9356645"/>
+              </p:ext>
+            </p:extLst>
+          </p:nvPr>
+        </p:nvGraphicFramePr>
+        <p:xfrm>
+          <a:off x="682030" y="314960"/>
+          <a:ext cx="9973188" cy="5085080"/>
+        </p:xfrm>
+        <a:graphic>
+          <a:graphicData uri="http://schemas.openxmlformats.org/drawingml/2006/table">
+            <a:tbl>
+              <a:tblPr firstRow="1" bandRow="1">
+                <a:tableStyleId>{5C22544A-7EE6-4342-B048-85BDC9FD1C3A}</a:tableStyleId>
+              </a:tblPr>
+              <a:tblGrid>
+                <a:gridCol w="3324396"/>
+                <a:gridCol w="3324396"/>
+                <a:gridCol w="3324396"/>
+              </a:tblGrid>
+              <a:tr h="283278">
+                <a:tc>
+                  <a:txBody>
+                    <a:bodyPr/>
+                    <a:lstStyle/>
+                    <a:p>
+                      <a:endParaRPr lang="en-US" dirty="0"/>
+                    </a:p>
+                  </a:txBody>
+                  <a:tcPr/>
+                </a:tc>
+                <a:tc>
+                  <a:txBody>
+                    <a:bodyPr/>
+                    <a:lstStyle/>
+                    <a:p>
+                      <a:endParaRPr lang="en-US" dirty="0"/>
+                    </a:p>
+                  </a:txBody>
+                  <a:tcPr/>
+                </a:tc>
+                <a:tc>
+                  <a:txBody>
+                    <a:bodyPr/>
+                    <a:lstStyle/>
+                    <a:p>
+                      <a:r>
+                        <a:rPr lang="en-US" dirty="0" smtClean="0"/>
+                        <a:t>User action</a:t>
+                      </a:r>
+                      <a:endParaRPr lang="en-US" dirty="0"/>
+                    </a:p>
+                  </a:txBody>
+                  <a:tcPr/>
+                </a:tc>
+              </a:tr>
+              <a:tr h="370840">
+                <a:tc>
+                  <a:txBody>
+                    <a:bodyPr/>
+                    <a:lstStyle/>
+                    <a:p>
+                      <a:r>
+                        <a:rPr lang="en-US" sz="1000" dirty="0" smtClean="0"/>
+                        <a:t>Home page</a:t>
+                      </a:r>
+                      <a:endParaRPr lang="en-US" sz="1000" dirty="0"/>
+                    </a:p>
+                  </a:txBody>
+                  <a:tcPr/>
+                </a:tc>
+                <a:tc>
+                  <a:txBody>
+                    <a:bodyPr/>
+                    <a:lstStyle/>
+                    <a:p>
+                      <a:r>
+                        <a:rPr lang="en-US" sz="1000" dirty="0" smtClean="0">
+                          <a:hlinkClick r:id="rId2"/>
+                        </a:rPr>
+                        <a:t>home.html.erb</a:t>
+                      </a:r>
+                      <a:endParaRPr lang="en-US" sz="1000" dirty="0" smtClean="0"/>
+                    </a:p>
+                    <a:p>
+                      <a:r>
+                        <a:rPr lang="en-US" sz="1000" dirty="0" smtClean="0"/>
+                        <a:t>Contains</a:t>
+                      </a:r>
+                    </a:p>
+                    <a:p>
+                      <a:endParaRPr lang="en-US" sz="1000" dirty="0" smtClean="0"/>
+                    </a:p>
+                    <a:p>
+                      <a:pPr marL="285750" indent="-285750">
+                        <a:buFont typeface="Arial" charset="0"/>
+                        <a:buChar char="•"/>
+                      </a:pPr>
+                      <a:r>
+                        <a:rPr lang="en-US" sz="1000" dirty="0" smtClean="0"/>
+                        <a:t>keyboard</a:t>
+                      </a:r>
+                      <a:r>
+                        <a:rPr lang="en-US" sz="1000" baseline="0" dirty="0" smtClean="0"/>
+                        <a:t> on the home </a:t>
+                      </a:r>
+                    </a:p>
+                    <a:p>
+                      <a:pPr marL="285750" indent="-285750">
+                        <a:buFont typeface="Arial" charset="0"/>
+                        <a:buChar char="•"/>
+                      </a:pPr>
+                      <a:r>
+                        <a:rPr lang="en-US" sz="1000" baseline="0" dirty="0" smtClean="0"/>
+                        <a:t>log in takes you to the users page</a:t>
+                      </a:r>
+                    </a:p>
+                    <a:p>
+                      <a:pPr marL="285750" indent="-285750">
+                        <a:buFont typeface="Arial" charset="0"/>
+                        <a:buChar char="•"/>
+                      </a:pPr>
+                      <a:r>
+                        <a:rPr lang="en-US" sz="1000" baseline="0" dirty="0" smtClean="0"/>
+                        <a:t>or sign up  takes you to the signup page </a:t>
+                      </a:r>
+                      <a:endParaRPr lang="en-US" sz="1000" dirty="0"/>
+                    </a:p>
+                  </a:txBody>
+                  <a:tcPr/>
+                </a:tc>
+                <a:tc>
+                  <a:txBody>
+                    <a:bodyPr/>
+                    <a:lstStyle/>
+                    <a:p>
+                      <a:r>
+                        <a:rPr lang="en-US" sz="1000" dirty="0" smtClean="0"/>
+                        <a:t>Anyone</a:t>
+                      </a:r>
+                      <a:r>
+                        <a:rPr lang="en-US" sz="1000" baseline="0" dirty="0" smtClean="0"/>
+                        <a:t> lands on the site</a:t>
+                      </a:r>
+                      <a:endParaRPr lang="en-US" sz="1000" dirty="0"/>
+                    </a:p>
+                  </a:txBody>
+                  <a:tcPr/>
+                </a:tc>
+              </a:tr>
+              <a:tr h="370840">
+                <a:tc>
+                  <a:txBody>
+                    <a:bodyPr/>
+                    <a:lstStyle/>
+                    <a:p>
+                      <a:r>
+                        <a:rPr lang="en-US" sz="1000" dirty="0" smtClean="0"/>
+                        <a:t>Users</a:t>
+                      </a:r>
+                      <a:r>
+                        <a:rPr lang="en-US" sz="1000" baseline="0" dirty="0" smtClean="0"/>
+                        <a:t> page</a:t>
+                      </a:r>
+                      <a:endParaRPr lang="en-US" sz="1000" dirty="0"/>
+                    </a:p>
+                  </a:txBody>
+                  <a:tcPr/>
+                </a:tc>
+                <a:tc>
+                  <a:txBody>
+                    <a:bodyPr/>
+                    <a:lstStyle/>
+                    <a:p>
+                      <a:r>
+                        <a:rPr lang="en-US" sz="1000" dirty="0" smtClean="0"/>
+                        <a:t>user/</a:t>
+                      </a:r>
+                      <a:r>
+                        <a:rPr lang="en-US" sz="1000" dirty="0" err="1" smtClean="0"/>
+                        <a:t>show.html.erb</a:t>
+                      </a:r>
+                      <a:r>
+                        <a:rPr lang="en-US" sz="1000" dirty="0" smtClean="0"/>
+                        <a:t>:</a:t>
+                      </a:r>
+                    </a:p>
+                    <a:p>
+                      <a:r>
+                        <a:rPr lang="en-US" sz="1000" dirty="0" smtClean="0"/>
+                        <a:t>Contains</a:t>
+                      </a:r>
+                    </a:p>
+                    <a:p>
+                      <a:pPr marL="285750" indent="-285750">
+                        <a:buFont typeface="Arial" charset="0"/>
+                        <a:buChar char="•"/>
+                      </a:pPr>
+                      <a:r>
+                        <a:rPr lang="en-US" sz="1000" dirty="0" smtClean="0"/>
+                        <a:t>list of all users existing projects – project name</a:t>
+                      </a:r>
+                      <a:r>
+                        <a:rPr lang="en-US" sz="1000" baseline="0" dirty="0" smtClean="0"/>
+                        <a:t> needs to be a link to a project page</a:t>
+                      </a:r>
+                      <a:endParaRPr lang="en-US" sz="1000" dirty="0" smtClean="0"/>
+                    </a:p>
+                    <a:p>
+                      <a:pPr marL="285750" indent="-285750">
+                        <a:buFont typeface="Arial" charset="0"/>
+                        <a:buChar char="•"/>
+                      </a:pPr>
+                      <a:r>
+                        <a:rPr lang="en-US" sz="1000" dirty="0" smtClean="0"/>
+                        <a:t>button to say new project – links to a new project form</a:t>
+                      </a:r>
+                    </a:p>
+                    <a:p>
+                      <a:endParaRPr lang="en-US" sz="1000" dirty="0"/>
+                    </a:p>
+                  </a:txBody>
+                  <a:tcPr/>
+                </a:tc>
+                <a:tc>
+                  <a:txBody>
+                    <a:bodyPr/>
+                    <a:lstStyle/>
+                    <a:p>
+                      <a:r>
+                        <a:rPr lang="en-US" sz="1000" dirty="0" smtClean="0"/>
+                        <a:t>User has signed in and land on the user’s page</a:t>
+                      </a:r>
+                      <a:endParaRPr lang="en-US" sz="1000" dirty="0"/>
+                    </a:p>
+                  </a:txBody>
+                  <a:tcPr/>
+                </a:tc>
+              </a:tr>
+              <a:tr h="370840">
+                <a:tc>
+                  <a:txBody>
+                    <a:bodyPr/>
+                    <a:lstStyle/>
+                    <a:p>
+                      <a:r>
+                        <a:rPr lang="en-US" sz="1000" dirty="0" smtClean="0"/>
+                        <a:t>New Projects page</a:t>
+                      </a:r>
+                      <a:endParaRPr lang="en-US" sz="1000" dirty="0"/>
+                    </a:p>
+                  </a:txBody>
+                  <a:tcPr/>
+                </a:tc>
+                <a:tc>
+                  <a:txBody>
+                    <a:bodyPr/>
+                    <a:lstStyle/>
+                    <a:p>
+                      <a:r>
+                        <a:rPr lang="en-US" sz="1000" dirty="0" smtClean="0"/>
+                        <a:t>projects/</a:t>
+                      </a:r>
+                      <a:r>
+                        <a:rPr lang="en-US" sz="1000" dirty="0" err="1" smtClean="0"/>
+                        <a:t>new.html.erb</a:t>
+                      </a:r>
+                      <a:endParaRPr lang="en-US" sz="1000" dirty="0" smtClean="0"/>
+                    </a:p>
+                    <a:p>
+                      <a:r>
+                        <a:rPr lang="en-US" sz="1000" dirty="0" smtClean="0"/>
+                        <a:t>Contains:</a:t>
+                      </a:r>
+                    </a:p>
+                    <a:p>
+                      <a:r>
+                        <a:rPr lang="en-US" sz="1000" dirty="0" smtClean="0"/>
+                        <a:t>project name and</a:t>
+                      </a:r>
+                      <a:r>
+                        <a:rPr lang="en-US" sz="1000" baseline="0" dirty="0" smtClean="0"/>
+                        <a:t> description </a:t>
+                      </a:r>
+                    </a:p>
+                    <a:p>
+                      <a:r>
+                        <a:rPr lang="en-US" sz="1000" dirty="0" smtClean="0"/>
+                        <a:t>button</a:t>
+                      </a:r>
+                      <a:r>
+                        <a:rPr lang="en-US" sz="1000" baseline="0" dirty="0" smtClean="0"/>
+                        <a:t> – create new song – using Yu</a:t>
+                      </a:r>
+                      <a:endParaRPr lang="en-US" sz="1000" dirty="0" smtClean="0"/>
+                    </a:p>
+                    <a:p>
+                      <a:endParaRPr lang="en-US" sz="1000" dirty="0"/>
+                    </a:p>
+                  </a:txBody>
+                  <a:tcPr/>
+                </a:tc>
+                <a:tc>
+                  <a:txBody>
+                    <a:bodyPr/>
+                    <a:lstStyle/>
+                    <a:p>
+                      <a:endParaRPr lang="en-US" sz="1000" dirty="0"/>
+                    </a:p>
+                  </a:txBody>
+                  <a:tcPr/>
+                </a:tc>
+              </a:tr>
+              <a:tr h="370840">
+                <a:tc>
+                  <a:txBody>
+                    <a:bodyPr/>
+                    <a:lstStyle/>
+                    <a:p>
+                      <a:endParaRPr lang="en-US" sz="1000" dirty="0"/>
+                    </a:p>
+                  </a:txBody>
+                  <a:tcPr/>
+                </a:tc>
+                <a:tc>
+                  <a:txBody>
+                    <a:bodyPr/>
+                    <a:lstStyle/>
+                    <a:p>
+                      <a:endParaRPr lang="en-US" sz="1000" dirty="0"/>
+                    </a:p>
+                  </a:txBody>
+                  <a:tcPr/>
+                </a:tc>
+                <a:tc>
+                  <a:txBody>
+                    <a:bodyPr/>
+                    <a:lstStyle/>
+                    <a:p>
+                      <a:endParaRPr lang="en-US" sz="1000" dirty="0"/>
+                    </a:p>
+                  </a:txBody>
+                  <a:tcPr/>
+                </a:tc>
+              </a:tr>
+              <a:tr h="370840">
+                <a:tc>
+                  <a:txBody>
+                    <a:bodyPr/>
+                    <a:lstStyle/>
+                    <a:p>
+                      <a:r>
+                        <a:rPr lang="en-US" sz="1000" dirty="0" smtClean="0"/>
+                        <a:t>Signup page </a:t>
+                      </a:r>
+                      <a:endParaRPr lang="en-US" sz="1000" dirty="0"/>
+                    </a:p>
+                  </a:txBody>
+                  <a:tcPr/>
+                </a:tc>
+                <a:tc>
+                  <a:txBody>
+                    <a:bodyPr/>
+                    <a:lstStyle/>
+                    <a:p>
+                      <a:endParaRPr lang="en-US" sz="1000" dirty="0"/>
+                    </a:p>
+                  </a:txBody>
+                  <a:tcPr/>
+                </a:tc>
+                <a:tc>
+                  <a:txBody>
+                    <a:bodyPr/>
+                    <a:lstStyle/>
+                    <a:p>
+                      <a:r>
+                        <a:rPr lang="en-US" sz="1000" dirty="0" smtClean="0"/>
+                        <a:t>User </a:t>
+                      </a:r>
+                      <a:endParaRPr lang="en-US" sz="1000" dirty="0"/>
+                    </a:p>
+                  </a:txBody>
+                  <a:tcPr/>
+                </a:tc>
+              </a:tr>
+              <a:tr h="370840">
+                <a:tc>
+                  <a:txBody>
+                    <a:bodyPr/>
+                    <a:lstStyle/>
+                    <a:p>
+                      <a:endParaRPr lang="en-US" sz="1000" dirty="0"/>
+                    </a:p>
+                  </a:txBody>
+                  <a:tcPr/>
+                </a:tc>
+                <a:tc>
+                  <a:txBody>
+                    <a:bodyPr/>
+                    <a:lstStyle/>
+                    <a:p>
+                      <a:endParaRPr lang="en-US" sz="1000" dirty="0"/>
+                    </a:p>
+                  </a:txBody>
+                  <a:tcPr/>
+                </a:tc>
+                <a:tc>
+                  <a:txBody>
+                    <a:bodyPr/>
+                    <a:lstStyle/>
+                    <a:p>
+                      <a:endParaRPr lang="en-US" sz="1000" dirty="0"/>
+                    </a:p>
+                  </a:txBody>
+                  <a:tcPr/>
+                </a:tc>
+              </a:tr>
+              <a:tr h="370840">
+                <a:tc>
+                  <a:txBody>
+                    <a:bodyPr/>
+                    <a:lstStyle/>
+                    <a:p>
+                      <a:r>
+                        <a:rPr lang="en-US" sz="1000" dirty="0" smtClean="0"/>
+                        <a:t>New project page</a:t>
+                      </a:r>
+                      <a:endParaRPr lang="en-US" sz="1000" dirty="0"/>
+                    </a:p>
+                  </a:txBody>
+                  <a:tcPr/>
+                </a:tc>
+                <a:tc>
+                  <a:txBody>
+                    <a:bodyPr/>
+                    <a:lstStyle/>
+                    <a:p>
+                      <a:endParaRPr lang="en-US" sz="1000" dirty="0"/>
+                    </a:p>
+                  </a:txBody>
+                  <a:tcPr/>
+                </a:tc>
+                <a:tc>
+                  <a:txBody>
+                    <a:bodyPr/>
+                    <a:lstStyle/>
+                    <a:p>
+                      <a:endParaRPr lang="en-US" sz="1000" dirty="0"/>
+                    </a:p>
+                  </a:txBody>
+                  <a:tcPr/>
+                </a:tc>
+              </a:tr>
+              <a:tr h="370840">
+                <a:tc>
+                  <a:txBody>
+                    <a:bodyPr/>
+                    <a:lstStyle/>
+                    <a:p>
+                      <a:endParaRPr lang="en-US" sz="1000" dirty="0"/>
+                    </a:p>
+                  </a:txBody>
+                  <a:tcPr/>
+                </a:tc>
+                <a:tc>
+                  <a:txBody>
+                    <a:bodyPr/>
+                    <a:lstStyle/>
+                    <a:p>
+                      <a:endParaRPr lang="en-US" sz="1000" dirty="0"/>
+                    </a:p>
+                  </a:txBody>
+                  <a:tcPr/>
+                </a:tc>
+                <a:tc>
+                  <a:txBody>
+                    <a:bodyPr/>
+                    <a:lstStyle/>
+                    <a:p>
+                      <a:endParaRPr lang="en-US" sz="1000" dirty="0"/>
+                    </a:p>
+                  </a:txBody>
+                  <a:tcPr/>
+                </a:tc>
+              </a:tr>
+            </a:tbl>
+          </a:graphicData>
+        </a:graphic>
+      </p:graphicFrame>
     </p:spTree>
     <p:extLst>
       <p:ext uri="{BB962C8B-B14F-4D97-AF65-F5344CB8AC3E}">
         <p14:creationId xmlns:p14="http://schemas.microsoft.com/office/powerpoint/2010/main" val="1030404061"/>
+      </p:ext>
+    </p:extLst>
+  </p:cSld>
+  <p:clrMapOvr>
+    <a:masterClrMapping/>
+  </p:clrMapOvr>
+</p:sld>
+</file>
+
+<file path=ppt/slides/slide8.xml><?xml version="1.0" encoding="utf-8"?>
+<p:sld xmlns:a="http://schemas.openxmlformats.org/drawingml/2006/main" xmlns:r="http://schemas.openxmlformats.org/officeDocument/2006/relationships" xmlns:p="http://schemas.openxmlformats.org/presentationml/2006/main">
+  <p:cSld>
+    <p:spTree>
+      <p:nvGrpSpPr>
+        <p:cNvPr id="1" name=""/>
+        <p:cNvGrpSpPr/>
+        <p:nvPr/>
+      </p:nvGrpSpPr>
+      <p:grpSpPr>
+        <a:xfrm>
+          <a:off x="0" y="0"/>
+          <a:ext cx="0" cy="0"/>
+          <a:chOff x="0" y="0"/>
+          <a:chExt cx="0" cy="0"/>
+        </a:xfrm>
+      </p:grpSpPr>
+      <p:sp>
+        <p:nvSpPr>
+          <p:cNvPr id="2" name="Title 1"/>
+          <p:cNvSpPr>
+            <a:spLocks noGrp="1"/>
+          </p:cNvSpPr>
+          <p:nvPr>
+            <p:ph type="title"/>
+          </p:nvPr>
+        </p:nvSpPr>
+        <p:spPr/>
+        <p:txBody>
+          <a:bodyPr/>
+          <a:lstStyle/>
+          <a:p>
+            <a:endParaRPr lang="en-US"/>
+          </a:p>
+        </p:txBody>
+      </p:sp>
+      <p:sp>
+        <p:nvSpPr>
+          <p:cNvPr id="3" name="Content Placeholder 2"/>
+          <p:cNvSpPr>
+            <a:spLocks noGrp="1"/>
+          </p:cNvSpPr>
+          <p:nvPr>
+            <p:ph idx="1"/>
+          </p:nvPr>
+        </p:nvSpPr>
+        <p:spPr/>
+        <p:txBody>
+          <a:bodyPr/>
+          <a:lstStyle/>
+          <a:p>
+            <a:endParaRPr lang="en-US"/>
+          </a:p>
+        </p:txBody>
+      </p:sp>
+    </p:spTree>
+    <p:extLst>
+      <p:ext uri="{BB962C8B-B14F-4D97-AF65-F5344CB8AC3E}">
+        <p14:creationId xmlns:p14="http://schemas.microsoft.com/office/powerpoint/2010/main" val="1576988254"/>
+      </p:ext>
+    </p:extLst>
+  </p:cSld>
+  <p:clrMapOvr>
+    <a:masterClrMapping/>
+  </p:clrMapOvr>
+</p:sld>
+</file>
+
+<file path=ppt/slides/slide9.xml><?xml version="1.0" encoding="utf-8"?>
+<p:sld xmlns:a="http://schemas.openxmlformats.org/drawingml/2006/main" xmlns:r="http://schemas.openxmlformats.org/officeDocument/2006/relationships" xmlns:p="http://schemas.openxmlformats.org/presentationml/2006/main">
+  <p:cSld>
+    <p:spTree>
+      <p:nvGrpSpPr>
+        <p:cNvPr id="1" name=""/>
+        <p:cNvGrpSpPr/>
+        <p:nvPr/>
+      </p:nvGrpSpPr>
+      <p:grpSpPr>
+        <a:xfrm>
+          <a:off x="0" y="0"/>
+          <a:ext cx="0" cy="0"/>
+          <a:chOff x="0" y="0"/>
+          <a:chExt cx="0" cy="0"/>
+        </a:xfrm>
+      </p:grpSpPr>
+      <p:sp>
+        <p:nvSpPr>
+          <p:cNvPr id="5" name="Freeform 4"/>
+          <p:cNvSpPr/>
+          <p:nvPr/>
+        </p:nvSpPr>
+        <p:spPr>
+          <a:xfrm>
+            <a:off x="781665" y="1268361"/>
+            <a:ext cx="8924228" cy="1622323"/>
+          </a:xfrm>
+          <a:custGeom>
+            <a:avLst/>
+            <a:gdLst>
+              <a:gd name="connsiteX0" fmla="*/ 0 w 8924228"/>
+              <a:gd name="connsiteY0" fmla="*/ 1179871 h 5216177"/>
+              <a:gd name="connsiteX1" fmla="*/ 14748 w 8924228"/>
+              <a:gd name="connsiteY1" fmla="*/ 943897 h 5216177"/>
+              <a:gd name="connsiteX2" fmla="*/ 58993 w 8924228"/>
+              <a:gd name="connsiteY2" fmla="*/ 855407 h 5216177"/>
+              <a:gd name="connsiteX3" fmla="*/ 103238 w 8924228"/>
+              <a:gd name="connsiteY3" fmla="*/ 752168 h 5216177"/>
+              <a:gd name="connsiteX4" fmla="*/ 132735 w 8924228"/>
+              <a:gd name="connsiteY4" fmla="*/ 707923 h 5216177"/>
+              <a:gd name="connsiteX5" fmla="*/ 191729 w 8924228"/>
+              <a:gd name="connsiteY5" fmla="*/ 604684 h 5216177"/>
+              <a:gd name="connsiteX6" fmla="*/ 265470 w 8924228"/>
+              <a:gd name="connsiteY6" fmla="*/ 471949 h 5216177"/>
+              <a:gd name="connsiteX7" fmla="*/ 324464 w 8924228"/>
+              <a:gd name="connsiteY7" fmla="*/ 442452 h 5216177"/>
+              <a:gd name="connsiteX8" fmla="*/ 412954 w 8924228"/>
+              <a:gd name="connsiteY8" fmla="*/ 339213 h 5216177"/>
+              <a:gd name="connsiteX9" fmla="*/ 457200 w 8924228"/>
+              <a:gd name="connsiteY9" fmla="*/ 309716 h 5216177"/>
+              <a:gd name="connsiteX10" fmla="*/ 516193 w 8924228"/>
+              <a:gd name="connsiteY10" fmla="*/ 250723 h 5216177"/>
+              <a:gd name="connsiteX11" fmla="*/ 619432 w 8924228"/>
+              <a:gd name="connsiteY11" fmla="*/ 191729 h 5216177"/>
+              <a:gd name="connsiteX12" fmla="*/ 693174 w 8924228"/>
+              <a:gd name="connsiteY12" fmla="*/ 132736 h 5216177"/>
+              <a:gd name="connsiteX13" fmla="*/ 811161 w 8924228"/>
+              <a:gd name="connsiteY13" fmla="*/ 73742 h 5216177"/>
+              <a:gd name="connsiteX14" fmla="*/ 884903 w 8924228"/>
+              <a:gd name="connsiteY14" fmla="*/ 29497 h 5216177"/>
+              <a:gd name="connsiteX15" fmla="*/ 988141 w 8924228"/>
+              <a:gd name="connsiteY15" fmla="*/ 14749 h 5216177"/>
+              <a:gd name="connsiteX16" fmla="*/ 1047135 w 8924228"/>
+              <a:gd name="connsiteY16" fmla="*/ 0 h 5216177"/>
+              <a:gd name="connsiteX17" fmla="*/ 1489587 w 8924228"/>
+              <a:gd name="connsiteY17" fmla="*/ 29497 h 5216177"/>
+              <a:gd name="connsiteX18" fmla="*/ 1548580 w 8924228"/>
+              <a:gd name="connsiteY18" fmla="*/ 58994 h 5216177"/>
+              <a:gd name="connsiteX19" fmla="*/ 1681316 w 8924228"/>
+              <a:gd name="connsiteY19" fmla="*/ 103239 h 5216177"/>
+              <a:gd name="connsiteX20" fmla="*/ 1799303 w 8924228"/>
+              <a:gd name="connsiteY20" fmla="*/ 147484 h 5216177"/>
+              <a:gd name="connsiteX21" fmla="*/ 1887793 w 8924228"/>
+              <a:gd name="connsiteY21" fmla="*/ 221226 h 5216177"/>
+              <a:gd name="connsiteX22" fmla="*/ 1976283 w 8924228"/>
+              <a:gd name="connsiteY22" fmla="*/ 280220 h 5216177"/>
+              <a:gd name="connsiteX23" fmla="*/ 2050025 w 8924228"/>
+              <a:gd name="connsiteY23" fmla="*/ 368710 h 5216177"/>
+              <a:gd name="connsiteX24" fmla="*/ 2079522 w 8924228"/>
+              <a:gd name="connsiteY24" fmla="*/ 471949 h 5216177"/>
+              <a:gd name="connsiteX25" fmla="*/ 2109019 w 8924228"/>
+              <a:gd name="connsiteY25" fmla="*/ 737420 h 5216177"/>
+              <a:gd name="connsiteX26" fmla="*/ 2123767 w 8924228"/>
+              <a:gd name="connsiteY26" fmla="*/ 825910 h 5216177"/>
+              <a:gd name="connsiteX27" fmla="*/ 2153264 w 8924228"/>
+              <a:gd name="connsiteY27" fmla="*/ 899652 h 5216177"/>
+              <a:gd name="connsiteX28" fmla="*/ 2153264 w 8924228"/>
+              <a:gd name="connsiteY28" fmla="*/ 1327355 h 5216177"/>
+              <a:gd name="connsiteX29" fmla="*/ 2138516 w 8924228"/>
+              <a:gd name="connsiteY29" fmla="*/ 1578078 h 5216177"/>
+              <a:gd name="connsiteX30" fmla="*/ 2109019 w 8924228"/>
+              <a:gd name="connsiteY30" fmla="*/ 1666568 h 5216177"/>
+              <a:gd name="connsiteX31" fmla="*/ 2123767 w 8924228"/>
+              <a:gd name="connsiteY31" fmla="*/ 2684207 h 5216177"/>
+              <a:gd name="connsiteX32" fmla="*/ 2256503 w 8924228"/>
+              <a:gd name="connsiteY32" fmla="*/ 2698955 h 5216177"/>
+              <a:gd name="connsiteX33" fmla="*/ 2418735 w 8924228"/>
+              <a:gd name="connsiteY33" fmla="*/ 2743200 h 5216177"/>
+              <a:gd name="connsiteX34" fmla="*/ 2566219 w 8924228"/>
+              <a:gd name="connsiteY34" fmla="*/ 2772697 h 5216177"/>
+              <a:gd name="connsiteX35" fmla="*/ 2964425 w 8924228"/>
+              <a:gd name="connsiteY35" fmla="*/ 2757949 h 5216177"/>
+              <a:gd name="connsiteX36" fmla="*/ 3229896 w 8924228"/>
+              <a:gd name="connsiteY36" fmla="*/ 2654710 h 5216177"/>
+              <a:gd name="connsiteX37" fmla="*/ 3421625 w 8924228"/>
+              <a:gd name="connsiteY37" fmla="*/ 2566220 h 5216177"/>
+              <a:gd name="connsiteX38" fmla="*/ 3657600 w 8924228"/>
+              <a:gd name="connsiteY38" fmla="*/ 2403987 h 5216177"/>
+              <a:gd name="connsiteX39" fmla="*/ 3790335 w 8924228"/>
+              <a:gd name="connsiteY39" fmla="*/ 2330245 h 5216177"/>
+              <a:gd name="connsiteX40" fmla="*/ 3996812 w 8924228"/>
+              <a:gd name="connsiteY40" fmla="*/ 2168013 h 5216177"/>
+              <a:gd name="connsiteX41" fmla="*/ 4100051 w 8924228"/>
+              <a:gd name="connsiteY41" fmla="*/ 2094271 h 5216177"/>
+              <a:gd name="connsiteX42" fmla="*/ 4188541 w 8924228"/>
+              <a:gd name="connsiteY42" fmla="*/ 2020529 h 5216177"/>
+              <a:gd name="connsiteX43" fmla="*/ 4291780 w 8924228"/>
+              <a:gd name="connsiteY43" fmla="*/ 1946787 h 5216177"/>
+              <a:gd name="connsiteX44" fmla="*/ 4350774 w 8924228"/>
+              <a:gd name="connsiteY44" fmla="*/ 1887794 h 5216177"/>
+              <a:gd name="connsiteX45" fmla="*/ 4468761 w 8924228"/>
+              <a:gd name="connsiteY45" fmla="*/ 1784555 h 5216177"/>
+              <a:gd name="connsiteX46" fmla="*/ 4498258 w 8924228"/>
+              <a:gd name="connsiteY46" fmla="*/ 1740310 h 5216177"/>
+              <a:gd name="connsiteX47" fmla="*/ 4572000 w 8924228"/>
+              <a:gd name="connsiteY47" fmla="*/ 1622323 h 5216177"/>
+              <a:gd name="connsiteX48" fmla="*/ 4601496 w 8924228"/>
+              <a:gd name="connsiteY48" fmla="*/ 1460091 h 5216177"/>
+              <a:gd name="connsiteX49" fmla="*/ 4616245 w 8924228"/>
+              <a:gd name="connsiteY49" fmla="*/ 1356852 h 5216177"/>
+              <a:gd name="connsiteX50" fmla="*/ 4645741 w 8924228"/>
+              <a:gd name="connsiteY50" fmla="*/ 1253613 h 5216177"/>
+              <a:gd name="connsiteX51" fmla="*/ 4660490 w 8924228"/>
+              <a:gd name="connsiteY51" fmla="*/ 1179871 h 5216177"/>
+              <a:gd name="connsiteX52" fmla="*/ 4704735 w 8924228"/>
+              <a:gd name="connsiteY52" fmla="*/ 1032387 h 5216177"/>
+              <a:gd name="connsiteX53" fmla="*/ 4793225 w 8924228"/>
+              <a:gd name="connsiteY53" fmla="*/ 870155 h 5216177"/>
+              <a:gd name="connsiteX54" fmla="*/ 4866967 w 8924228"/>
+              <a:gd name="connsiteY54" fmla="*/ 766916 h 5216177"/>
+              <a:gd name="connsiteX55" fmla="*/ 4940709 w 8924228"/>
+              <a:gd name="connsiteY55" fmla="*/ 648929 h 5216177"/>
+              <a:gd name="connsiteX56" fmla="*/ 5102941 w 8924228"/>
+              <a:gd name="connsiteY56" fmla="*/ 486697 h 5216177"/>
+              <a:gd name="connsiteX57" fmla="*/ 5338916 w 8924228"/>
+              <a:gd name="connsiteY57" fmla="*/ 353962 h 5216177"/>
+              <a:gd name="connsiteX58" fmla="*/ 5442154 w 8924228"/>
+              <a:gd name="connsiteY58" fmla="*/ 324465 h 5216177"/>
+              <a:gd name="connsiteX59" fmla="*/ 5604387 w 8924228"/>
+              <a:gd name="connsiteY59" fmla="*/ 280220 h 5216177"/>
+              <a:gd name="connsiteX60" fmla="*/ 5796116 w 8924228"/>
+              <a:gd name="connsiteY60" fmla="*/ 339213 h 5216177"/>
+              <a:gd name="connsiteX61" fmla="*/ 5810864 w 8924228"/>
+              <a:gd name="connsiteY61" fmla="*/ 412955 h 5216177"/>
+              <a:gd name="connsiteX62" fmla="*/ 5825612 w 8924228"/>
+              <a:gd name="connsiteY62" fmla="*/ 781665 h 5216177"/>
+              <a:gd name="connsiteX63" fmla="*/ 5914103 w 8924228"/>
+              <a:gd name="connsiteY63" fmla="*/ 2580968 h 5216177"/>
+              <a:gd name="connsiteX64" fmla="*/ 5928851 w 8924228"/>
+              <a:gd name="connsiteY64" fmla="*/ 3170904 h 5216177"/>
+              <a:gd name="connsiteX65" fmla="*/ 5958348 w 8924228"/>
+              <a:gd name="connsiteY65" fmla="*/ 3480620 h 5216177"/>
+              <a:gd name="connsiteX66" fmla="*/ 5973096 w 8924228"/>
+              <a:gd name="connsiteY66" fmla="*/ 3746091 h 5216177"/>
+              <a:gd name="connsiteX67" fmla="*/ 5958348 w 8924228"/>
+              <a:gd name="connsiteY67" fmla="*/ 5088194 h 5216177"/>
+              <a:gd name="connsiteX68" fmla="*/ 5855109 w 8924228"/>
+              <a:gd name="connsiteY68" fmla="*/ 5206181 h 5216177"/>
+              <a:gd name="connsiteX69" fmla="*/ 5943600 w 8924228"/>
+              <a:gd name="connsiteY69" fmla="*/ 5176684 h 5216177"/>
+              <a:gd name="connsiteX70" fmla="*/ 6061587 w 8924228"/>
+              <a:gd name="connsiteY70" fmla="*/ 5132439 h 5216177"/>
+              <a:gd name="connsiteX71" fmla="*/ 6150077 w 8924228"/>
+              <a:gd name="connsiteY71" fmla="*/ 5088194 h 5216177"/>
+              <a:gd name="connsiteX72" fmla="*/ 6651522 w 8924228"/>
+              <a:gd name="connsiteY72" fmla="*/ 4970207 h 5216177"/>
+              <a:gd name="connsiteX73" fmla="*/ 7093974 w 8924228"/>
+              <a:gd name="connsiteY73" fmla="*/ 4911213 h 5216177"/>
+              <a:gd name="connsiteX74" fmla="*/ 7683909 w 8924228"/>
+              <a:gd name="connsiteY74" fmla="*/ 4277033 h 5216177"/>
+              <a:gd name="connsiteX75" fmla="*/ 7875638 w 8924228"/>
+              <a:gd name="connsiteY75" fmla="*/ 4085304 h 5216177"/>
+              <a:gd name="connsiteX76" fmla="*/ 8421329 w 8924228"/>
+              <a:gd name="connsiteY76" fmla="*/ 3318387 h 5216177"/>
+              <a:gd name="connsiteX77" fmla="*/ 8672051 w 8924228"/>
+              <a:gd name="connsiteY77" fmla="*/ 2890684 h 5216177"/>
+              <a:gd name="connsiteX78" fmla="*/ 8804787 w 8924228"/>
+              <a:gd name="connsiteY78" fmla="*/ 2536723 h 5216177"/>
+              <a:gd name="connsiteX79" fmla="*/ 8834283 w 8924228"/>
+              <a:gd name="connsiteY79" fmla="*/ 2433484 h 5216177"/>
+              <a:gd name="connsiteX80" fmla="*/ 8893277 w 8924228"/>
+              <a:gd name="connsiteY80" fmla="*/ 2197510 h 5216177"/>
+              <a:gd name="connsiteX81" fmla="*/ 8922774 w 8924228"/>
+              <a:gd name="connsiteY81" fmla="*/ 2050026 h 5216177"/>
+              <a:gd name="connsiteX82" fmla="*/ 8922774 w 8924228"/>
+              <a:gd name="connsiteY82" fmla="*/ 1873045 h 5216177"/>
+            </a:gdLst>
+            <a:ahLst/>
+            <a:cxnLst>
+              <a:cxn ang="0">
+                <a:pos x="connsiteX0" y="connsiteY0"/>
+              </a:cxn>
+              <a:cxn ang="0">
+                <a:pos x="connsiteX1" y="connsiteY1"/>
+              </a:cxn>
+              <a:cxn ang="0">
+                <a:pos x="connsiteX2" y="connsiteY2"/>
+              </a:cxn>
+              <a:cxn ang="0">
+                <a:pos x="connsiteX3" y="connsiteY3"/>
+              </a:cxn>
+              <a:cxn ang="0">
+                <a:pos x="connsiteX4" y="connsiteY4"/>
+              </a:cxn>
+              <a:cxn ang="0">
+                <a:pos x="connsiteX5" y="connsiteY5"/>
+              </a:cxn>
+              <a:cxn ang="0">
+                <a:pos x="connsiteX6" y="connsiteY6"/>
+              </a:cxn>
+              <a:cxn ang="0">
+                <a:pos x="connsiteX7" y="connsiteY7"/>
+              </a:cxn>
+              <a:cxn ang="0">
+                <a:pos x="connsiteX8" y="connsiteY8"/>
+              </a:cxn>
+              <a:cxn ang="0">
+                <a:pos x="connsiteX9" y="connsiteY9"/>
+              </a:cxn>
+              <a:cxn ang="0">
+                <a:pos x="connsiteX10" y="connsiteY10"/>
+              </a:cxn>
+              <a:cxn ang="0">
+                <a:pos x="connsiteX11" y="connsiteY11"/>
+              </a:cxn>
+              <a:cxn ang="0">
+                <a:pos x="connsiteX12" y="connsiteY12"/>
+              </a:cxn>
+              <a:cxn ang="0">
+                <a:pos x="connsiteX13" y="connsiteY13"/>
+              </a:cxn>
+              <a:cxn ang="0">
+                <a:pos x="connsiteX14" y="connsiteY14"/>
+              </a:cxn>
+              <a:cxn ang="0">
+                <a:pos x="connsiteX15" y="connsiteY15"/>
+              </a:cxn>
+              <a:cxn ang="0">
+                <a:pos x="connsiteX16" y="connsiteY16"/>
+              </a:cxn>
+              <a:cxn ang="0">
+                <a:pos x="connsiteX17" y="connsiteY17"/>
+              </a:cxn>
+              <a:cxn ang="0">
+                <a:pos x="connsiteX18" y="connsiteY18"/>
+              </a:cxn>
+              <a:cxn ang="0">
+                <a:pos x="connsiteX19" y="connsiteY19"/>
+              </a:cxn>
+              <a:cxn ang="0">
+                <a:pos x="connsiteX20" y="connsiteY20"/>
+              </a:cxn>
+              <a:cxn ang="0">
+                <a:pos x="connsiteX21" y="connsiteY21"/>
+              </a:cxn>
+              <a:cxn ang="0">
+                <a:pos x="connsiteX22" y="connsiteY22"/>
+              </a:cxn>
+              <a:cxn ang="0">
+                <a:pos x="connsiteX23" y="connsiteY23"/>
+              </a:cxn>
+              <a:cxn ang="0">
+                <a:pos x="connsiteX24" y="connsiteY24"/>
+              </a:cxn>
+              <a:cxn ang="0">
+                <a:pos x="connsiteX25" y="connsiteY25"/>
+              </a:cxn>
+              <a:cxn ang="0">
+                <a:pos x="connsiteX26" y="connsiteY26"/>
+              </a:cxn>
+              <a:cxn ang="0">
+                <a:pos x="connsiteX27" y="connsiteY27"/>
+              </a:cxn>
+              <a:cxn ang="0">
+                <a:pos x="connsiteX28" y="connsiteY28"/>
+              </a:cxn>
+              <a:cxn ang="0">
+                <a:pos x="connsiteX29" y="connsiteY29"/>
+              </a:cxn>
+              <a:cxn ang="0">
+                <a:pos x="connsiteX30" y="connsiteY30"/>
+              </a:cxn>
+              <a:cxn ang="0">
+                <a:pos x="connsiteX31" y="connsiteY31"/>
+              </a:cxn>
+              <a:cxn ang="0">
+                <a:pos x="connsiteX32" y="connsiteY32"/>
+              </a:cxn>
+              <a:cxn ang="0">
+                <a:pos x="connsiteX33" y="connsiteY33"/>
+              </a:cxn>
+              <a:cxn ang="0">
+                <a:pos x="connsiteX34" y="connsiteY34"/>
+              </a:cxn>
+              <a:cxn ang="0">
+                <a:pos x="connsiteX35" y="connsiteY35"/>
+              </a:cxn>
+              <a:cxn ang="0">
+                <a:pos x="connsiteX36" y="connsiteY36"/>
+              </a:cxn>
+              <a:cxn ang="0">
+                <a:pos x="connsiteX37" y="connsiteY37"/>
+              </a:cxn>
+              <a:cxn ang="0">
+                <a:pos x="connsiteX38" y="connsiteY38"/>
+              </a:cxn>
+              <a:cxn ang="0">
+                <a:pos x="connsiteX39" y="connsiteY39"/>
+              </a:cxn>
+              <a:cxn ang="0">
+                <a:pos x="connsiteX40" y="connsiteY40"/>
+              </a:cxn>
+              <a:cxn ang="0">
+                <a:pos x="connsiteX41" y="connsiteY41"/>
+              </a:cxn>
+              <a:cxn ang="0">
+                <a:pos x="connsiteX42" y="connsiteY42"/>
+              </a:cxn>
+              <a:cxn ang="0">
+                <a:pos x="connsiteX43" y="connsiteY43"/>
+              </a:cxn>
+              <a:cxn ang="0">
+                <a:pos x="connsiteX44" y="connsiteY44"/>
+              </a:cxn>
+              <a:cxn ang="0">
+                <a:pos x="connsiteX45" y="connsiteY45"/>
+              </a:cxn>
+              <a:cxn ang="0">
+                <a:pos x="connsiteX46" y="connsiteY46"/>
+              </a:cxn>
+              <a:cxn ang="0">
+                <a:pos x="connsiteX47" y="connsiteY47"/>
+              </a:cxn>
+              <a:cxn ang="0">
+                <a:pos x="connsiteX48" y="connsiteY48"/>
+              </a:cxn>
+              <a:cxn ang="0">
+                <a:pos x="connsiteX49" y="connsiteY49"/>
+              </a:cxn>
+              <a:cxn ang="0">
+                <a:pos x="connsiteX50" y="connsiteY50"/>
+              </a:cxn>
+              <a:cxn ang="0">
+                <a:pos x="connsiteX51" y="connsiteY51"/>
+              </a:cxn>
+              <a:cxn ang="0">
+                <a:pos x="connsiteX52" y="connsiteY52"/>
+              </a:cxn>
+              <a:cxn ang="0">
+                <a:pos x="connsiteX53" y="connsiteY53"/>
+              </a:cxn>
+              <a:cxn ang="0">
+                <a:pos x="connsiteX54" y="connsiteY54"/>
+              </a:cxn>
+              <a:cxn ang="0">
+                <a:pos x="connsiteX55" y="connsiteY55"/>
+              </a:cxn>
+              <a:cxn ang="0">
+                <a:pos x="connsiteX56" y="connsiteY56"/>
+              </a:cxn>
+              <a:cxn ang="0">
+                <a:pos x="connsiteX57" y="connsiteY57"/>
+              </a:cxn>
+              <a:cxn ang="0">
+                <a:pos x="connsiteX58" y="connsiteY58"/>
+              </a:cxn>
+              <a:cxn ang="0">
+                <a:pos x="connsiteX59" y="connsiteY59"/>
+              </a:cxn>
+              <a:cxn ang="0">
+                <a:pos x="connsiteX60" y="connsiteY60"/>
+              </a:cxn>
+              <a:cxn ang="0">
+                <a:pos x="connsiteX61" y="connsiteY61"/>
+              </a:cxn>
+              <a:cxn ang="0">
+                <a:pos x="connsiteX62" y="connsiteY62"/>
+              </a:cxn>
+              <a:cxn ang="0">
+                <a:pos x="connsiteX63" y="connsiteY63"/>
+              </a:cxn>
+              <a:cxn ang="0">
+                <a:pos x="connsiteX64" y="connsiteY64"/>
+              </a:cxn>
+              <a:cxn ang="0">
+                <a:pos x="connsiteX65" y="connsiteY65"/>
+              </a:cxn>
+              <a:cxn ang="0">
+                <a:pos x="connsiteX66" y="connsiteY66"/>
+              </a:cxn>
+              <a:cxn ang="0">
+                <a:pos x="connsiteX67" y="connsiteY67"/>
+              </a:cxn>
+              <a:cxn ang="0">
+                <a:pos x="connsiteX68" y="connsiteY68"/>
+              </a:cxn>
+              <a:cxn ang="0">
+                <a:pos x="connsiteX69" y="connsiteY69"/>
+              </a:cxn>
+              <a:cxn ang="0">
+                <a:pos x="connsiteX70" y="connsiteY70"/>
+              </a:cxn>
+              <a:cxn ang="0">
+                <a:pos x="connsiteX71" y="connsiteY71"/>
+              </a:cxn>
+              <a:cxn ang="0">
+                <a:pos x="connsiteX72" y="connsiteY72"/>
+              </a:cxn>
+              <a:cxn ang="0">
+                <a:pos x="connsiteX73" y="connsiteY73"/>
+              </a:cxn>
+              <a:cxn ang="0">
+                <a:pos x="connsiteX74" y="connsiteY74"/>
+              </a:cxn>
+              <a:cxn ang="0">
+                <a:pos x="connsiteX75" y="connsiteY75"/>
+              </a:cxn>
+              <a:cxn ang="0">
+                <a:pos x="connsiteX76" y="connsiteY76"/>
+              </a:cxn>
+              <a:cxn ang="0">
+                <a:pos x="connsiteX77" y="connsiteY77"/>
+              </a:cxn>
+              <a:cxn ang="0">
+                <a:pos x="connsiteX78" y="connsiteY78"/>
+              </a:cxn>
+              <a:cxn ang="0">
+                <a:pos x="connsiteX79" y="connsiteY79"/>
+              </a:cxn>
+              <a:cxn ang="0">
+                <a:pos x="connsiteX80" y="connsiteY80"/>
+              </a:cxn>
+              <a:cxn ang="0">
+                <a:pos x="connsiteX81" y="connsiteY81"/>
+              </a:cxn>
+              <a:cxn ang="0">
+                <a:pos x="connsiteX82" y="connsiteY82"/>
+              </a:cxn>
+            </a:cxnLst>
+            <a:rect l="l" t="t" r="r" b="b"/>
+            <a:pathLst>
+              <a:path w="8924228" h="5216177">
+                <a:moveTo>
+                  <a:pt x="0" y="1179871"/>
+                </a:moveTo>
+                <a:cubicBezTo>
+                  <a:pt x="4916" y="1101213"/>
+                  <a:pt x="6498" y="1022275"/>
+                  <a:pt x="14748" y="943897"/>
+                </a:cubicBezTo>
+                <a:cubicBezTo>
+                  <a:pt x="19109" y="902463"/>
+                  <a:pt x="39106" y="890209"/>
+                  <a:pt x="58993" y="855407"/>
+                </a:cubicBezTo>
+                <a:cubicBezTo>
+                  <a:pt x="181755" y="640575"/>
+                  <a:pt x="20506" y="917631"/>
+                  <a:pt x="103238" y="752168"/>
+                </a:cubicBezTo>
+                <a:cubicBezTo>
+                  <a:pt x="111165" y="736314"/>
+                  <a:pt x="122903" y="722671"/>
+                  <a:pt x="132735" y="707923"/>
+                </a:cubicBezTo>
+                <a:cubicBezTo>
+                  <a:pt x="168432" y="600828"/>
+                  <a:pt x="117321" y="738618"/>
+                  <a:pt x="191729" y="604684"/>
+                </a:cubicBezTo>
+                <a:cubicBezTo>
+                  <a:pt x="226324" y="542412"/>
+                  <a:pt x="209082" y="520282"/>
+                  <a:pt x="265470" y="471949"/>
+                </a:cubicBezTo>
+                <a:cubicBezTo>
+                  <a:pt x="282163" y="457641"/>
+                  <a:pt x="304799" y="452284"/>
+                  <a:pt x="324464" y="442452"/>
+                </a:cubicBezTo>
+                <a:cubicBezTo>
+                  <a:pt x="357014" y="399051"/>
+                  <a:pt x="371870" y="373450"/>
+                  <a:pt x="412954" y="339213"/>
+                </a:cubicBezTo>
+                <a:cubicBezTo>
+                  <a:pt x="426571" y="327865"/>
+                  <a:pt x="443742" y="321252"/>
+                  <a:pt x="457200" y="309716"/>
+                </a:cubicBezTo>
+                <a:cubicBezTo>
+                  <a:pt x="478315" y="291618"/>
+                  <a:pt x="495078" y="268821"/>
+                  <a:pt x="516193" y="250723"/>
+                </a:cubicBezTo>
+                <a:cubicBezTo>
+                  <a:pt x="568994" y="205465"/>
+                  <a:pt x="556661" y="233576"/>
+                  <a:pt x="619432" y="191729"/>
+                </a:cubicBezTo>
+                <a:cubicBezTo>
+                  <a:pt x="645624" y="174268"/>
+                  <a:pt x="666365" y="149234"/>
+                  <a:pt x="693174" y="132736"/>
+                </a:cubicBezTo>
+                <a:cubicBezTo>
+                  <a:pt x="730622" y="109691"/>
+                  <a:pt x="773456" y="96365"/>
+                  <a:pt x="811161" y="73742"/>
+                </a:cubicBezTo>
+                <a:cubicBezTo>
+                  <a:pt x="835742" y="58994"/>
+                  <a:pt x="857708" y="38562"/>
+                  <a:pt x="884903" y="29497"/>
+                </a:cubicBezTo>
+                <a:cubicBezTo>
+                  <a:pt x="917881" y="18504"/>
+                  <a:pt x="953940" y="20967"/>
+                  <a:pt x="988141" y="14749"/>
+                </a:cubicBezTo>
+                <a:cubicBezTo>
+                  <a:pt x="1008084" y="11123"/>
+                  <a:pt x="1027470" y="4916"/>
+                  <a:pt x="1047135" y="0"/>
+                </a:cubicBezTo>
+                <a:cubicBezTo>
+                  <a:pt x="1194619" y="9832"/>
+                  <a:pt x="1342788" y="12226"/>
+                  <a:pt x="1489587" y="29497"/>
+                </a:cubicBezTo>
+                <a:cubicBezTo>
+                  <a:pt x="1511422" y="32066"/>
+                  <a:pt x="1528060" y="51102"/>
+                  <a:pt x="1548580" y="58994"/>
+                </a:cubicBezTo>
+                <a:cubicBezTo>
+                  <a:pt x="1592110" y="75736"/>
+                  <a:pt x="1637336" y="87717"/>
+                  <a:pt x="1681316" y="103239"/>
+                </a:cubicBezTo>
+                <a:cubicBezTo>
+                  <a:pt x="1720925" y="117219"/>
+                  <a:pt x="1759974" y="132736"/>
+                  <a:pt x="1799303" y="147484"/>
+                </a:cubicBezTo>
+                <a:cubicBezTo>
+                  <a:pt x="1828800" y="172065"/>
+                  <a:pt x="1857076" y="198188"/>
+                  <a:pt x="1887793" y="221226"/>
+                </a:cubicBezTo>
+                <a:cubicBezTo>
+                  <a:pt x="1916153" y="242497"/>
+                  <a:pt x="1948300" y="258455"/>
+                  <a:pt x="1976283" y="280220"/>
+                </a:cubicBezTo>
+                <a:cubicBezTo>
+                  <a:pt x="2002973" y="300979"/>
+                  <a:pt x="2034530" y="337720"/>
+                  <a:pt x="2050025" y="368710"/>
+                </a:cubicBezTo>
+                <a:cubicBezTo>
+                  <a:pt x="2060607" y="389873"/>
+                  <a:pt x="2074795" y="453040"/>
+                  <a:pt x="2079522" y="471949"/>
+                </a:cubicBezTo>
+                <a:cubicBezTo>
+                  <a:pt x="2089542" y="572154"/>
+                  <a:pt x="2095098" y="639974"/>
+                  <a:pt x="2109019" y="737420"/>
+                </a:cubicBezTo>
+                <a:cubicBezTo>
+                  <a:pt x="2113248" y="767023"/>
+                  <a:pt x="2115899" y="797060"/>
+                  <a:pt x="2123767" y="825910"/>
+                </a:cubicBezTo>
+                <a:cubicBezTo>
+                  <a:pt x="2130733" y="851451"/>
+                  <a:pt x="2143432" y="875071"/>
+                  <a:pt x="2153264" y="899652"/>
+                </a:cubicBezTo>
+                <a:cubicBezTo>
+                  <a:pt x="2186129" y="1096845"/>
+                  <a:pt x="2171162" y="969376"/>
+                  <a:pt x="2153264" y="1327355"/>
+                </a:cubicBezTo>
+                <a:cubicBezTo>
+                  <a:pt x="2149083" y="1410969"/>
+                  <a:pt x="2149344" y="1495062"/>
+                  <a:pt x="2138516" y="1578078"/>
+                </a:cubicBezTo>
+                <a:cubicBezTo>
+                  <a:pt x="2134495" y="1608909"/>
+                  <a:pt x="2109019" y="1666568"/>
+                  <a:pt x="2109019" y="1666568"/>
+                </a:cubicBezTo>
+                <a:cubicBezTo>
+                  <a:pt x="2113935" y="2005781"/>
+                  <a:pt x="2075790" y="2348368"/>
+                  <a:pt x="2123767" y="2684207"/>
+                </a:cubicBezTo>
+                <a:cubicBezTo>
+                  <a:pt x="2130063" y="2728277"/>
+                  <a:pt x="2212503" y="2692186"/>
+                  <a:pt x="2256503" y="2698955"/>
+                </a:cubicBezTo>
+                <a:cubicBezTo>
+                  <a:pt x="2282589" y="2702968"/>
+                  <a:pt x="2415417" y="2742419"/>
+                  <a:pt x="2418735" y="2743200"/>
+                </a:cubicBezTo>
+                <a:cubicBezTo>
+                  <a:pt x="2467537" y="2754683"/>
+                  <a:pt x="2566219" y="2772697"/>
+                  <a:pt x="2566219" y="2772697"/>
+                </a:cubicBezTo>
+                <a:cubicBezTo>
+                  <a:pt x="2698954" y="2767781"/>
+                  <a:pt x="2832328" y="2771854"/>
+                  <a:pt x="2964425" y="2757949"/>
+                </a:cubicBezTo>
+                <a:cubicBezTo>
+                  <a:pt x="3118725" y="2741707"/>
+                  <a:pt x="3110639" y="2714339"/>
+                  <a:pt x="3229896" y="2654710"/>
+                </a:cubicBezTo>
+                <a:cubicBezTo>
+                  <a:pt x="3259288" y="2640014"/>
+                  <a:pt x="3375373" y="2593200"/>
+                  <a:pt x="3421625" y="2566220"/>
+                </a:cubicBezTo>
+                <a:cubicBezTo>
+                  <a:pt x="3713227" y="2396119"/>
+                  <a:pt x="3362667" y="2594827"/>
+                  <a:pt x="3657600" y="2403987"/>
+                </a:cubicBezTo>
+                <a:cubicBezTo>
+                  <a:pt x="3700094" y="2376491"/>
+                  <a:pt x="3747841" y="2357741"/>
+                  <a:pt x="3790335" y="2330245"/>
+                </a:cubicBezTo>
+                <a:cubicBezTo>
+                  <a:pt x="3898568" y="2260212"/>
+                  <a:pt x="3902164" y="2240819"/>
+                  <a:pt x="3996812" y="2168013"/>
+                </a:cubicBezTo>
+                <a:cubicBezTo>
+                  <a:pt x="4030332" y="2142228"/>
+                  <a:pt x="4066531" y="2120056"/>
+                  <a:pt x="4100051" y="2094271"/>
+                </a:cubicBezTo>
+                <a:cubicBezTo>
+                  <a:pt x="4130485" y="2070860"/>
+                  <a:pt x="4158107" y="2043940"/>
+                  <a:pt x="4188541" y="2020529"/>
+                </a:cubicBezTo>
+                <a:cubicBezTo>
+                  <a:pt x="4222061" y="1994744"/>
+                  <a:pt x="4259049" y="1973567"/>
+                  <a:pt x="4291780" y="1946787"/>
+                </a:cubicBezTo>
+                <a:cubicBezTo>
+                  <a:pt x="4313304" y="1929177"/>
+                  <a:pt x="4329989" y="1906270"/>
+                  <a:pt x="4350774" y="1887794"/>
+                </a:cubicBezTo>
+                <a:cubicBezTo>
+                  <a:pt x="4402000" y="1842260"/>
+                  <a:pt x="4427967" y="1833507"/>
+                  <a:pt x="4468761" y="1784555"/>
+                </a:cubicBezTo>
+                <a:cubicBezTo>
+                  <a:pt x="4480109" y="1770938"/>
+                  <a:pt x="4487955" y="1754734"/>
+                  <a:pt x="4498258" y="1740310"/>
+                </a:cubicBezTo>
+                <a:cubicBezTo>
+                  <a:pt x="4562075" y="1650966"/>
+                  <a:pt x="4525803" y="1714716"/>
+                  <a:pt x="4572000" y="1622323"/>
+                </a:cubicBezTo>
+                <a:cubicBezTo>
+                  <a:pt x="4587341" y="1545615"/>
+                  <a:pt x="4588915" y="1541866"/>
+                  <a:pt x="4601496" y="1460091"/>
+                </a:cubicBezTo>
+                <a:cubicBezTo>
+                  <a:pt x="4606782" y="1425733"/>
+                  <a:pt x="4608961" y="1390843"/>
+                  <a:pt x="4616245" y="1356852"/>
+                </a:cubicBezTo>
+                <a:cubicBezTo>
+                  <a:pt x="4623744" y="1321856"/>
+                  <a:pt x="4637061" y="1288334"/>
+                  <a:pt x="4645741" y="1253613"/>
+                </a:cubicBezTo>
+                <a:cubicBezTo>
+                  <a:pt x="4651821" y="1229294"/>
+                  <a:pt x="4655052" y="1204342"/>
+                  <a:pt x="4660490" y="1179871"/>
+                </a:cubicBezTo>
+                <a:cubicBezTo>
+                  <a:pt x="4670785" y="1133544"/>
+                  <a:pt x="4687226" y="1074408"/>
+                  <a:pt x="4704735" y="1032387"/>
+                </a:cubicBezTo>
+                <a:cubicBezTo>
+                  <a:pt x="4723396" y="987600"/>
+                  <a:pt x="4765394" y="911901"/>
+                  <a:pt x="4793225" y="870155"/>
+                </a:cubicBezTo>
+                <a:cubicBezTo>
+                  <a:pt x="4816683" y="834967"/>
+                  <a:pt x="4843509" y="802104"/>
+                  <a:pt x="4866967" y="766916"/>
+                </a:cubicBezTo>
+                <a:cubicBezTo>
+                  <a:pt x="4892693" y="728327"/>
+                  <a:pt x="4910835" y="684405"/>
+                  <a:pt x="4940709" y="648929"/>
+                </a:cubicBezTo>
+                <a:cubicBezTo>
+                  <a:pt x="4989971" y="590431"/>
+                  <a:pt x="5036285" y="524190"/>
+                  <a:pt x="5102941" y="486697"/>
+                </a:cubicBezTo>
+                <a:cubicBezTo>
+                  <a:pt x="5181599" y="442452"/>
+                  <a:pt x="5257500" y="392900"/>
+                  <a:pt x="5338916" y="353962"/>
+                </a:cubicBezTo>
+                <a:cubicBezTo>
+                  <a:pt x="5371203" y="338520"/>
+                  <a:pt x="5407947" y="334990"/>
+                  <a:pt x="5442154" y="324465"/>
+                </a:cubicBezTo>
+                <a:cubicBezTo>
+                  <a:pt x="5581153" y="281696"/>
+                  <a:pt x="5478608" y="305375"/>
+                  <a:pt x="5604387" y="280220"/>
+                </a:cubicBezTo>
+                <a:cubicBezTo>
+                  <a:pt x="5764316" y="293547"/>
+                  <a:pt x="5771193" y="239520"/>
+                  <a:pt x="5796116" y="339213"/>
+                </a:cubicBezTo>
+                <a:cubicBezTo>
+                  <a:pt x="5802196" y="363532"/>
+                  <a:pt x="5805948" y="388374"/>
+                  <a:pt x="5810864" y="412955"/>
+                </a:cubicBezTo>
+                <a:cubicBezTo>
+                  <a:pt x="5815780" y="535858"/>
+                  <a:pt x="5819648" y="658808"/>
+                  <a:pt x="5825612" y="781665"/>
+                </a:cubicBezTo>
+                <a:cubicBezTo>
+                  <a:pt x="5838636" y="1049966"/>
+                  <a:pt x="5899349" y="2167865"/>
+                  <a:pt x="5914103" y="2580968"/>
+                </a:cubicBezTo>
+                <a:cubicBezTo>
+                  <a:pt x="5921124" y="2777549"/>
+                  <a:pt x="5919189" y="2974435"/>
+                  <a:pt x="5928851" y="3170904"/>
+                </a:cubicBezTo>
+                <a:cubicBezTo>
+                  <a:pt x="5933945" y="3274485"/>
+                  <a:pt x="5950394" y="3377220"/>
+                  <a:pt x="5958348" y="3480620"/>
+                </a:cubicBezTo>
+                <a:cubicBezTo>
+                  <a:pt x="5965145" y="3568986"/>
+                  <a:pt x="5968180" y="3657601"/>
+                  <a:pt x="5973096" y="3746091"/>
+                </a:cubicBezTo>
+                <a:cubicBezTo>
+                  <a:pt x="5968180" y="4193459"/>
+                  <a:pt x="5994384" y="4642253"/>
+                  <a:pt x="5958348" y="5088194"/>
+                </a:cubicBezTo>
+                <a:cubicBezTo>
+                  <a:pt x="5954139" y="5140283"/>
+                  <a:pt x="5863700" y="5154633"/>
+                  <a:pt x="5855109" y="5206181"/>
+                </a:cubicBezTo>
+                <a:cubicBezTo>
+                  <a:pt x="5849998" y="5236851"/>
+                  <a:pt x="5914731" y="5188232"/>
+                  <a:pt x="5943600" y="5176684"/>
+                </a:cubicBezTo>
+                <a:cubicBezTo>
+                  <a:pt x="6072137" y="5125269"/>
+                  <a:pt x="5933862" y="5164369"/>
+                  <a:pt x="6061587" y="5132439"/>
+                </a:cubicBezTo>
+                <a:cubicBezTo>
+                  <a:pt x="6091084" y="5117691"/>
+                  <a:pt x="6119198" y="5099773"/>
+                  <a:pt x="6150077" y="5088194"/>
+                </a:cubicBezTo>
+                <a:cubicBezTo>
+                  <a:pt x="6289473" y="5035920"/>
+                  <a:pt x="6537368" y="4991951"/>
+                  <a:pt x="6651522" y="4970207"/>
+                </a:cubicBezTo>
+                <a:cubicBezTo>
+                  <a:pt x="6903412" y="4922228"/>
+                  <a:pt x="6875086" y="4929454"/>
+                  <a:pt x="7093974" y="4911213"/>
+                </a:cubicBezTo>
+                <a:cubicBezTo>
+                  <a:pt x="7393511" y="4568885"/>
+                  <a:pt x="7277821" y="4693533"/>
+                  <a:pt x="7683909" y="4277033"/>
+                </a:cubicBezTo>
+                <a:cubicBezTo>
+                  <a:pt x="7747005" y="4212320"/>
+                  <a:pt x="7819798" y="4156373"/>
+                  <a:pt x="7875638" y="4085304"/>
+                </a:cubicBezTo>
+                <a:cubicBezTo>
+                  <a:pt x="8158715" y="3725022"/>
+                  <a:pt x="8037584" y="3888522"/>
+                  <a:pt x="8421329" y="3318387"/>
+                </a:cubicBezTo>
+                <a:cubicBezTo>
+                  <a:pt x="8525912" y="3163007"/>
+                  <a:pt x="8590478" y="3060104"/>
+                  <a:pt x="8672051" y="2890684"/>
+                </a:cubicBezTo>
+                <a:cubicBezTo>
+                  <a:pt x="8728307" y="2773846"/>
+                  <a:pt x="8765869" y="2659963"/>
+                  <a:pt x="8804787" y="2536723"/>
+                </a:cubicBezTo>
+                <a:cubicBezTo>
+                  <a:pt x="8815564" y="2502594"/>
+                  <a:pt x="8823758" y="2467691"/>
+                  <a:pt x="8834283" y="2433484"/>
+                </a:cubicBezTo>
+                <a:cubicBezTo>
+                  <a:pt x="8892832" y="2243196"/>
+                  <a:pt x="8836401" y="2462935"/>
+                  <a:pt x="8893277" y="2197510"/>
+                </a:cubicBezTo>
+                <a:cubicBezTo>
+                  <a:pt x="8905346" y="2141186"/>
+                  <a:pt x="8919343" y="2111773"/>
+                  <a:pt x="8922774" y="2050026"/>
+                </a:cubicBezTo>
+                <a:cubicBezTo>
+                  <a:pt x="8926047" y="1991123"/>
+                  <a:pt x="8922774" y="1932039"/>
+                  <a:pt x="8922774" y="1873045"/>
+                </a:cubicBezTo>
+              </a:path>
+            </a:pathLst>
+          </a:custGeom>
+          <a:noFill/>
+        </p:spPr>
+        <p:style>
+          <a:lnRef idx="2">
+            <a:schemeClr val="accent1">
+              <a:shade val="50000"/>
+            </a:schemeClr>
+          </a:lnRef>
+          <a:fillRef idx="1">
+            <a:schemeClr val="accent1"/>
+          </a:fillRef>
+          <a:effectRef idx="0">
+            <a:schemeClr val="accent1"/>
+          </a:effectRef>
+          <a:fontRef idx="minor">
+            <a:schemeClr val="lt1"/>
+          </a:fontRef>
+        </p:style>
+        <p:txBody>
+          <a:bodyPr rtlCol="0" anchor="ctr"/>
+          <a:lstStyle/>
+          <a:p>
+            <a:pPr algn="ctr"/>
+            <a:endParaRPr lang="en-US"/>
+          </a:p>
+        </p:txBody>
+      </p:sp>
+      <p:sp>
+        <p:nvSpPr>
+          <p:cNvPr id="6" name="Rectangle 5"/>
+          <p:cNvSpPr/>
+          <p:nvPr/>
+        </p:nvSpPr>
+        <p:spPr>
+          <a:xfrm>
+            <a:off x="825910" y="3333135"/>
+            <a:ext cx="737419" cy="1961536"/>
+          </a:xfrm>
+          <a:prstGeom prst="rect">
+            <a:avLst/>
+          </a:prstGeom>
+          <a:ln>
+            <a:solidFill>
+              <a:schemeClr val="accent1"/>
+            </a:solidFill>
+          </a:ln>
+        </p:spPr>
+        <p:style>
+          <a:lnRef idx="2">
+            <a:schemeClr val="accent1">
+              <a:shade val="50000"/>
+            </a:schemeClr>
+          </a:lnRef>
+          <a:fillRef idx="1">
+            <a:schemeClr val="accent1"/>
+          </a:fillRef>
+          <a:effectRef idx="0">
+            <a:schemeClr val="accent1"/>
+          </a:effectRef>
+          <a:fontRef idx="minor">
+            <a:schemeClr val="lt1"/>
+          </a:fontRef>
+        </p:style>
+        <p:txBody>
+          <a:bodyPr rtlCol="0" anchor="ctr"/>
+          <a:lstStyle/>
+          <a:p>
+            <a:pPr algn="ctr"/>
+            <a:endParaRPr lang="en-US"/>
+          </a:p>
+        </p:txBody>
+      </p:sp>
+      <p:sp>
+        <p:nvSpPr>
+          <p:cNvPr id="7" name="Rectangle 6"/>
+          <p:cNvSpPr/>
+          <p:nvPr/>
+        </p:nvSpPr>
+        <p:spPr>
+          <a:xfrm>
+            <a:off x="2659626" y="3333135"/>
+            <a:ext cx="737419" cy="1961536"/>
+          </a:xfrm>
+          <a:prstGeom prst="rect">
+            <a:avLst/>
+          </a:prstGeom>
+          <a:ln>
+            <a:solidFill>
+              <a:schemeClr val="accent1"/>
+            </a:solidFill>
+          </a:ln>
+        </p:spPr>
+        <p:style>
+          <a:lnRef idx="2">
+            <a:schemeClr val="accent1">
+              <a:shade val="50000"/>
+            </a:schemeClr>
+          </a:lnRef>
+          <a:fillRef idx="1">
+            <a:schemeClr val="accent1"/>
+          </a:fillRef>
+          <a:effectRef idx="0">
+            <a:schemeClr val="accent1"/>
+          </a:effectRef>
+          <a:fontRef idx="minor">
+            <a:schemeClr val="lt1"/>
+          </a:fontRef>
+        </p:style>
+        <p:txBody>
+          <a:bodyPr rtlCol="0" anchor="ctr"/>
+          <a:lstStyle/>
+          <a:p>
+            <a:pPr algn="ctr"/>
+            <a:endParaRPr lang="en-US"/>
+          </a:p>
+        </p:txBody>
+      </p:sp>
+      <p:sp>
+        <p:nvSpPr>
+          <p:cNvPr id="8" name="Rectangle 7"/>
+          <p:cNvSpPr/>
+          <p:nvPr/>
+        </p:nvSpPr>
+        <p:spPr>
+          <a:xfrm>
+            <a:off x="6484374" y="3205315"/>
+            <a:ext cx="737419" cy="1961536"/>
+          </a:xfrm>
+          <a:prstGeom prst="rect">
+            <a:avLst/>
+          </a:prstGeom>
+          <a:ln>
+            <a:solidFill>
+              <a:schemeClr val="accent1"/>
+            </a:solidFill>
+          </a:ln>
+        </p:spPr>
+        <p:style>
+          <a:lnRef idx="2">
+            <a:schemeClr val="accent1">
+              <a:shade val="50000"/>
+            </a:schemeClr>
+          </a:lnRef>
+          <a:fillRef idx="1">
+            <a:schemeClr val="accent1"/>
+          </a:fillRef>
+          <a:effectRef idx="0">
+            <a:schemeClr val="accent1"/>
+          </a:effectRef>
+          <a:fontRef idx="minor">
+            <a:schemeClr val="lt1"/>
+          </a:fontRef>
+        </p:style>
+        <p:txBody>
+          <a:bodyPr rtlCol="0" anchor="ctr"/>
+          <a:lstStyle/>
+          <a:p>
+            <a:pPr algn="ctr"/>
+            <a:endParaRPr lang="en-US"/>
+          </a:p>
+        </p:txBody>
+      </p:sp>
+    </p:spTree>
+    <p:extLst>
+      <p:ext uri="{BB962C8B-B14F-4D97-AF65-F5344CB8AC3E}">
+        <p14:creationId xmlns:p14="http://schemas.microsoft.com/office/powerpoint/2010/main" val="1635207643"/>
       </p:ext>
     </p:extLst>
   </p:cSld>

</xml_diff>